<commit_message>
Deploy hylandtechoutreach/bgcneo to github.com/hylandtechoutreach/bgcneo.git:gh-pages
</commit_message>
<xml_diff>
--- a/Session5HtmlIntro/HelloHtml.pptx
+++ b/Session5HtmlIntro/HelloHtml.pptx
@@ -224,7 +224,7 @@
           <a:p>
             <a:fld id="{19104133-B5B0-4351-8158-4F0E5EB1E2BF}" type="datetimeFigureOut">
               <a:rPr lang="en-US" smtClean="0"/>
-              <a:t>4/21/2021</a:t>
+              <a:t>5/7/2021</a:t>
             </a:fld>
             <a:endParaRPr lang="en-US"/>
           </a:p>
@@ -1688,7 +1688,7 @@
             <a:fld id="{1C2D31DE-C454-491C-B5C3-F097855E3DF7}" type="datetime4">
               <a:rPr lang="en-US" smtClean="0"/>
               <a:pPr/>
-              <a:t>April 21, 2021</a:t>
+              <a:t>May 7, 2021</a:t>
             </a:fld>
             <a:endParaRPr lang="en-US" dirty="0"/>
           </a:p>
@@ -5080,7 +5080,7 @@
           <a:p>
             <a:fld id="{5958763E-B898-436D-883D-03711491D54A}" type="datetimeFigureOut">
               <a:rPr lang="en-US" smtClean="0"/>
-              <a:t>4/21/2021</a:t>
+              <a:t>5/7/2021</a:t>
             </a:fld>
             <a:endParaRPr lang="en-US"/>
           </a:p>
@@ -5273,7 +5273,7 @@
           <a:p>
             <a:fld id="{5958763E-B898-436D-883D-03711491D54A}" type="datetimeFigureOut">
               <a:rPr lang="en-US" smtClean="0"/>
-              <a:t>4/21/2021</a:t>
+              <a:t>5/7/2021</a:t>
             </a:fld>
             <a:endParaRPr lang="en-US"/>
           </a:p>
@@ -5523,7 +5523,7 @@
           <a:p>
             <a:fld id="{5958763E-B898-436D-883D-03711491D54A}" type="datetimeFigureOut">
               <a:rPr lang="en-US" smtClean="0"/>
-              <a:t>4/21/2021</a:t>
+              <a:t>5/7/2021</a:t>
             </a:fld>
             <a:endParaRPr lang="en-US"/>
           </a:p>
@@ -5871,7 +5871,7 @@
           <a:p>
             <a:fld id="{5958763E-B898-436D-883D-03711491D54A}" type="datetimeFigureOut">
               <a:rPr lang="en-US" smtClean="0"/>
-              <a:t>4/21/2021</a:t>
+              <a:t>5/7/2021</a:t>
             </a:fld>
             <a:endParaRPr lang="en-US"/>
           </a:p>
@@ -6287,7 +6287,7 @@
           <a:p>
             <a:fld id="{5958763E-B898-436D-883D-03711491D54A}" type="datetimeFigureOut">
               <a:rPr lang="en-US" smtClean="0"/>
-              <a:t>4/21/2021</a:t>
+              <a:t>5/7/2021</a:t>
             </a:fld>
             <a:endParaRPr lang="en-US"/>
           </a:p>
@@ -6788,7 +6788,7 @@
           <a:p>
             <a:fld id="{5958763E-B898-436D-883D-03711491D54A}" type="datetimeFigureOut">
               <a:rPr lang="en-US" smtClean="0"/>
-              <a:t>4/21/2021</a:t>
+              <a:t>5/7/2021</a:t>
             </a:fld>
             <a:endParaRPr lang="en-US"/>
           </a:p>
@@ -7239,7 +7239,7 @@
           <a:p>
             <a:fld id="{5958763E-B898-436D-883D-03711491D54A}" type="datetimeFigureOut">
               <a:rPr lang="en-US" smtClean="0"/>
-              <a:t>4/21/2021</a:t>
+              <a:t>5/7/2021</a:t>
             </a:fld>
             <a:endParaRPr lang="en-US"/>
           </a:p>
@@ -7850,7 +7850,7 @@
           <a:p>
             <a:fld id="{5958763E-B898-436D-883D-03711491D54A}" type="datetimeFigureOut">
               <a:rPr lang="en-US" smtClean="0"/>
-              <a:t>4/21/2021</a:t>
+              <a:t>5/7/2021</a:t>
             </a:fld>
             <a:endParaRPr lang="en-US"/>
           </a:p>
@@ -8621,7 +8621,7 @@
           <a:p>
             <a:fld id="{5958763E-B898-436D-883D-03711491D54A}" type="datetimeFigureOut">
               <a:rPr lang="en-US" smtClean="0"/>
-              <a:t>4/21/2021</a:t>
+              <a:t>5/7/2021</a:t>
             </a:fld>
             <a:endParaRPr lang="en-US"/>
           </a:p>
@@ -8725,7 +8725,7 @@
           <a:p>
             <a:fld id="{5958763E-B898-436D-883D-03711491D54A}" type="datetimeFigureOut">
               <a:rPr lang="en-US" smtClean="0"/>
-              <a:t>4/21/2021</a:t>
+              <a:t>5/7/2021</a:t>
             </a:fld>
             <a:endParaRPr lang="en-US"/>
           </a:p>
@@ -9052,7 +9052,7 @@
             <a:fld id="{1C2D31DE-C454-491C-B5C3-F097855E3DF7}" type="datetime4">
               <a:rPr lang="en-US" smtClean="0"/>
               <a:pPr/>
-              <a:t>April 21, 2021</a:t>
+              <a:t>May 7, 2021</a:t>
             </a:fld>
             <a:endParaRPr lang="en-US" dirty="0"/>
           </a:p>
@@ -12204,7 +12204,7 @@
           <a:p>
             <a:fld id="{5958763E-B898-436D-883D-03711491D54A}" type="datetimeFigureOut">
               <a:rPr lang="en-US" smtClean="0"/>
-              <a:t>4/21/2021</a:t>
+              <a:t>5/7/2021</a:t>
             </a:fld>
             <a:endParaRPr lang="en-US"/>
           </a:p>
@@ -12328,7 +12328,7 @@
           <a:p>
             <a:fld id="{5958763E-B898-436D-883D-03711491D54A}" type="datetimeFigureOut">
               <a:rPr lang="en-US" smtClean="0"/>
-              <a:t>4/21/2021</a:t>
+              <a:t>5/7/2021</a:t>
             </a:fld>
             <a:endParaRPr lang="en-US"/>
           </a:p>
@@ -12452,7 +12452,7 @@
           <a:p>
             <a:fld id="{5958763E-B898-436D-883D-03711491D54A}" type="datetimeFigureOut">
               <a:rPr lang="en-US" smtClean="0"/>
-              <a:t>4/21/2021</a:t>
+              <a:t>5/7/2021</a:t>
             </a:fld>
             <a:endParaRPr lang="en-US"/>
           </a:p>
@@ -12576,7 +12576,7 @@
           <a:p>
             <a:fld id="{5958763E-B898-436D-883D-03711491D54A}" type="datetimeFigureOut">
               <a:rPr lang="en-US" smtClean="0"/>
-              <a:t>4/21/2021</a:t>
+              <a:t>5/7/2021</a:t>
             </a:fld>
             <a:endParaRPr lang="en-US"/>
           </a:p>
@@ -12700,7 +12700,7 @@
           <a:p>
             <a:fld id="{5958763E-B898-436D-883D-03711491D54A}" type="datetimeFigureOut">
               <a:rPr lang="en-US" smtClean="0"/>
-              <a:t>4/21/2021</a:t>
+              <a:t>5/7/2021</a:t>
             </a:fld>
             <a:endParaRPr lang="en-US"/>
           </a:p>
@@ -12824,7 +12824,7 @@
           <a:p>
             <a:fld id="{5958763E-B898-436D-883D-03711491D54A}" type="datetimeFigureOut">
               <a:rPr lang="en-US" smtClean="0"/>
-              <a:t>4/21/2021</a:t>
+              <a:t>5/7/2021</a:t>
             </a:fld>
             <a:endParaRPr lang="en-US"/>
           </a:p>
@@ -12948,7 +12948,7 @@
           <a:p>
             <a:fld id="{5958763E-B898-436D-883D-03711491D54A}" type="datetimeFigureOut">
               <a:rPr lang="en-US" smtClean="0"/>
-              <a:t>4/21/2021</a:t>
+              <a:t>5/7/2021</a:t>
             </a:fld>
             <a:endParaRPr lang="en-US"/>
           </a:p>
@@ -13072,7 +13072,7 @@
           <a:p>
             <a:fld id="{5958763E-B898-436D-883D-03711491D54A}" type="datetimeFigureOut">
               <a:rPr lang="en-US" smtClean="0"/>
-              <a:t>4/21/2021</a:t>
+              <a:t>5/7/2021</a:t>
             </a:fld>
             <a:endParaRPr lang="en-US"/>
           </a:p>
@@ -13205,7 +13205,7 @@
           <a:p>
             <a:fld id="{5958763E-B898-436D-883D-03711491D54A}" type="datetimeFigureOut">
               <a:rPr lang="en-US" smtClean="0"/>
-              <a:t>4/21/2021</a:t>
+              <a:t>5/7/2021</a:t>
             </a:fld>
             <a:endParaRPr lang="en-US"/>
           </a:p>
@@ -16544,7 +16544,7 @@
             <a:fld id="{1C2D31DE-C454-491C-B5C3-F097855E3DF7}" type="datetime4">
               <a:rPr lang="en-US" smtClean="0"/>
               <a:pPr/>
-              <a:t>April 21, 2021</a:t>
+              <a:t>May 7, 2021</a:t>
             </a:fld>
             <a:endParaRPr lang="en-US" dirty="0"/>
           </a:p>
@@ -28780,7 +28780,7 @@
           <a:p>
             <a:fld id="{5958763E-B898-436D-883D-03711491D54A}" type="datetimeFigureOut">
               <a:rPr lang="en-US" smtClean="0"/>
-              <a:t>4/21/2021</a:t>
+              <a:t>5/7/2021</a:t>
             </a:fld>
             <a:endParaRPr lang="en-US"/>
           </a:p>
@@ -29182,7 +29182,7 @@
           <a:p>
             <a:fld id="{5958763E-B898-436D-883D-03711491D54A}" type="datetimeFigureOut">
               <a:rPr lang="en-US" smtClean="0"/>
-              <a:t>4/21/2021</a:t>
+              <a:t>5/7/2021</a:t>
             </a:fld>
             <a:endParaRPr lang="en-US"/>
           </a:p>
@@ -29476,7 +29476,7 @@
           <a:p>
             <a:fld id="{5958763E-B898-436D-883D-03711491D54A}" type="datetimeFigureOut">
               <a:rPr lang="en-US" smtClean="0"/>
-              <a:t>4/21/2021</a:t>
+              <a:t>5/7/2021</a:t>
             </a:fld>
             <a:endParaRPr lang="en-US"/>
           </a:p>
@@ -29677,7 +29677,7 @@
           <a:p>
             <a:fld id="{5958763E-B898-436D-883D-03711491D54A}" type="datetimeFigureOut">
               <a:rPr lang="en-US" smtClean="0"/>
-              <a:t>4/21/2021</a:t>
+              <a:t>5/7/2021</a:t>
             </a:fld>
             <a:endParaRPr lang="en-US"/>
           </a:p>
@@ -29938,7 +29938,7 @@
           <a:p>
             <a:fld id="{5958763E-B898-436D-883D-03711491D54A}" type="datetimeFigureOut">
               <a:rPr lang="en-US" smtClean="0"/>
-              <a:t>4/21/2021</a:t>
+              <a:t>5/7/2021</a:t>
             </a:fld>
             <a:endParaRPr lang="en-US"/>
           </a:p>
@@ -30446,7 +30446,7 @@
           <a:p>
             <a:fld id="{5958763E-B898-436D-883D-03711491D54A}" type="datetimeFigureOut">
               <a:rPr lang="en-US" smtClean="0"/>
-              <a:t>4/21/2021</a:t>
+              <a:t>5/7/2021</a:t>
             </a:fld>
             <a:endParaRPr lang="en-US"/>
           </a:p>
@@ -30925,7 +30925,7 @@
           <a:p>
             <a:fld id="{5958763E-B898-436D-883D-03711491D54A}" type="datetimeFigureOut">
               <a:rPr lang="en-US" smtClean="0"/>
-              <a:t>4/21/2021</a:t>
+              <a:t>5/7/2021</a:t>
             </a:fld>
             <a:endParaRPr lang="en-US"/>
           </a:p>
@@ -31744,7 +31744,7 @@
           <a:p>
             <a:fld id="{5958763E-B898-436D-883D-03711491D54A}" type="datetimeFigureOut">
               <a:rPr lang="en-US" smtClean="0"/>
-              <a:t>4/21/2021</a:t>
+              <a:t>5/7/2021</a:t>
             </a:fld>
             <a:endParaRPr lang="en-US"/>
           </a:p>
@@ -31945,7 +31945,7 @@
           <a:p>
             <a:fld id="{5958763E-B898-436D-883D-03711491D54A}" type="datetimeFigureOut">
               <a:rPr lang="en-US" smtClean="0"/>
-              <a:t>4/21/2021</a:t>
+              <a:t>5/7/2021</a:t>
             </a:fld>
             <a:endParaRPr lang="en-US"/>
           </a:p>
@@ -32280,7 +32280,7 @@
           <a:p>
             <a:fld id="{5958763E-B898-436D-883D-03711491D54A}" type="datetimeFigureOut">
               <a:rPr lang="en-US" smtClean="0"/>
-              <a:t>4/21/2021</a:t>
+              <a:t>5/7/2021</a:t>
             </a:fld>
             <a:endParaRPr lang="en-US"/>
           </a:p>
@@ -32510,7 +32510,7 @@
           <a:p>
             <a:fld id="{5958763E-B898-436D-883D-03711491D54A}" type="datetimeFigureOut">
               <a:rPr lang="en-US" smtClean="0"/>
-              <a:t>4/21/2021</a:t>
+              <a:t>5/7/2021</a:t>
             </a:fld>
             <a:endParaRPr lang="en-US"/>
           </a:p>
@@ -32754,7 +32754,7 @@
           <a:p>
             <a:fld id="{5958763E-B898-436D-883D-03711491D54A}" type="datetimeFigureOut">
               <a:rPr lang="en-US" smtClean="0"/>
-              <a:t>4/21/2021</a:t>
+              <a:t>5/7/2021</a:t>
             </a:fld>
             <a:endParaRPr lang="en-US"/>
           </a:p>
@@ -39069,7 +39069,7 @@
         <p:spPr>
           <a:xfrm>
             <a:off x="212658" y="4343400"/>
-            <a:ext cx="11766683" cy="849463"/>
+            <a:ext cx="11260134" cy="849463"/>
           </a:xfrm>
           <a:prstGeom prst="rect">
             <a:avLst/>
@@ -39207,23 +39207,6 @@
                   <a:noFill/>
                 </a:ln>
                 <a:solidFill>
-                  <a:srgbClr val="D4D4D4"/>
-                </a:solidFill>
-                <a:effectLst/>
-                <a:uLnTx/>
-                <a:uFillTx/>
-                <a:latin typeface="Consolas" panose="020B0609020204030204" pitchFamily="49" charset="0"/>
-                <a:ea typeface="+mn-ea"/>
-                <a:cs typeface="+mn-cs"/>
-              </a:rPr>
-              <a:t> </a:t>
-            </a:r>
-            <a:r>
-              <a:rPr kumimoji="0" lang="en-US" sz="3600" b="0" i="0" u="none" strike="noStrike" kern="1200" cap="none" spc="0" normalizeH="0" baseline="0" noProof="0" dirty="0">
-                <a:ln>
-                  <a:noFill/>
-                </a:ln>
-                <a:solidFill>
                   <a:srgbClr val="808080"/>
                 </a:solidFill>
                 <a:effectLst/>
@@ -39233,7 +39216,7 @@
                 <a:ea typeface="+mn-ea"/>
                 <a:cs typeface="+mn-cs"/>
               </a:rPr>
-              <a:t>/&gt;</a:t>
+              <a:t>&gt;</a:t>
             </a:r>
             <a:endParaRPr kumimoji="0" lang="en-US" sz="3600" b="0" i="0" u="none" strike="noStrike" kern="1200" cap="none" spc="0" normalizeH="0" baseline="0" noProof="0" dirty="0">
               <a:ln>
@@ -41161,20 +41144,11 @@
             <a:r>
               <a:rPr lang="en-US" sz="1050" dirty="0">
                 <a:solidFill>
-                  <a:srgbClr val="D4D4D4"/>
-                </a:solidFill>
-                <a:latin typeface="Consolas" panose="020B0609020204030204" pitchFamily="49" charset="0"/>
-              </a:rPr>
-              <a:t> </a:t>
-            </a:r>
-            <a:r>
-              <a:rPr lang="en-US" sz="1050" dirty="0">
-                <a:solidFill>
                   <a:srgbClr val="808080"/>
                 </a:solidFill>
                 <a:latin typeface="Consolas" panose="020B0609020204030204" pitchFamily="49" charset="0"/>
               </a:rPr>
-              <a:t>/&gt;</a:t>
+              <a:t>&gt;</a:t>
             </a:r>
             <a:endParaRPr lang="en-US" sz="1050" dirty="0">
               <a:solidFill>

</xml_diff>

<commit_message>
hellohtml ppt format tweak
</commit_message>
<xml_diff>
--- a/Session5HtmlIntro/HelloHtml.pptx
+++ b/Session5HtmlIntro/HelloHtml.pptx
@@ -224,7 +224,7 @@
           <a:p>
             <a:fld id="{19104133-B5B0-4351-8158-4F0E5EB1E2BF}" type="datetimeFigureOut">
               <a:rPr lang="en-US" smtClean="0"/>
-              <a:t>5/7/2021</a:t>
+              <a:t>6/24/2021</a:t>
             </a:fld>
             <a:endParaRPr lang="en-US"/>
           </a:p>
@@ -1688,7 +1688,7 @@
             <a:fld id="{1C2D31DE-C454-491C-B5C3-F097855E3DF7}" type="datetime4">
               <a:rPr lang="en-US" smtClean="0"/>
               <a:pPr/>
-              <a:t>May 7, 2021</a:t>
+              <a:t>June 24, 2021</a:t>
             </a:fld>
             <a:endParaRPr lang="en-US" dirty="0"/>
           </a:p>
@@ -5080,7 +5080,7 @@
           <a:p>
             <a:fld id="{5958763E-B898-436D-883D-03711491D54A}" type="datetimeFigureOut">
               <a:rPr lang="en-US" smtClean="0"/>
-              <a:t>5/7/2021</a:t>
+              <a:t>6/24/2021</a:t>
             </a:fld>
             <a:endParaRPr lang="en-US"/>
           </a:p>
@@ -5273,7 +5273,7 @@
           <a:p>
             <a:fld id="{5958763E-B898-436D-883D-03711491D54A}" type="datetimeFigureOut">
               <a:rPr lang="en-US" smtClean="0"/>
-              <a:t>5/7/2021</a:t>
+              <a:t>6/24/2021</a:t>
             </a:fld>
             <a:endParaRPr lang="en-US"/>
           </a:p>
@@ -5523,7 +5523,7 @@
           <a:p>
             <a:fld id="{5958763E-B898-436D-883D-03711491D54A}" type="datetimeFigureOut">
               <a:rPr lang="en-US" smtClean="0"/>
-              <a:t>5/7/2021</a:t>
+              <a:t>6/24/2021</a:t>
             </a:fld>
             <a:endParaRPr lang="en-US"/>
           </a:p>
@@ -5871,7 +5871,7 @@
           <a:p>
             <a:fld id="{5958763E-B898-436D-883D-03711491D54A}" type="datetimeFigureOut">
               <a:rPr lang="en-US" smtClean="0"/>
-              <a:t>5/7/2021</a:t>
+              <a:t>6/24/2021</a:t>
             </a:fld>
             <a:endParaRPr lang="en-US"/>
           </a:p>
@@ -6287,7 +6287,7 @@
           <a:p>
             <a:fld id="{5958763E-B898-436D-883D-03711491D54A}" type="datetimeFigureOut">
               <a:rPr lang="en-US" smtClean="0"/>
-              <a:t>5/7/2021</a:t>
+              <a:t>6/24/2021</a:t>
             </a:fld>
             <a:endParaRPr lang="en-US"/>
           </a:p>
@@ -6788,7 +6788,7 @@
           <a:p>
             <a:fld id="{5958763E-B898-436D-883D-03711491D54A}" type="datetimeFigureOut">
               <a:rPr lang="en-US" smtClean="0"/>
-              <a:t>5/7/2021</a:t>
+              <a:t>6/24/2021</a:t>
             </a:fld>
             <a:endParaRPr lang="en-US"/>
           </a:p>
@@ -7239,7 +7239,7 @@
           <a:p>
             <a:fld id="{5958763E-B898-436D-883D-03711491D54A}" type="datetimeFigureOut">
               <a:rPr lang="en-US" smtClean="0"/>
-              <a:t>5/7/2021</a:t>
+              <a:t>6/24/2021</a:t>
             </a:fld>
             <a:endParaRPr lang="en-US"/>
           </a:p>
@@ -7850,7 +7850,7 @@
           <a:p>
             <a:fld id="{5958763E-B898-436D-883D-03711491D54A}" type="datetimeFigureOut">
               <a:rPr lang="en-US" smtClean="0"/>
-              <a:t>5/7/2021</a:t>
+              <a:t>6/24/2021</a:t>
             </a:fld>
             <a:endParaRPr lang="en-US"/>
           </a:p>
@@ -8621,7 +8621,7 @@
           <a:p>
             <a:fld id="{5958763E-B898-436D-883D-03711491D54A}" type="datetimeFigureOut">
               <a:rPr lang="en-US" smtClean="0"/>
-              <a:t>5/7/2021</a:t>
+              <a:t>6/24/2021</a:t>
             </a:fld>
             <a:endParaRPr lang="en-US"/>
           </a:p>
@@ -8725,7 +8725,7 @@
           <a:p>
             <a:fld id="{5958763E-B898-436D-883D-03711491D54A}" type="datetimeFigureOut">
               <a:rPr lang="en-US" smtClean="0"/>
-              <a:t>5/7/2021</a:t>
+              <a:t>6/24/2021</a:t>
             </a:fld>
             <a:endParaRPr lang="en-US"/>
           </a:p>
@@ -9052,7 +9052,7 @@
             <a:fld id="{1C2D31DE-C454-491C-B5C3-F097855E3DF7}" type="datetime4">
               <a:rPr lang="en-US" smtClean="0"/>
               <a:pPr/>
-              <a:t>May 7, 2021</a:t>
+              <a:t>June 24, 2021</a:t>
             </a:fld>
             <a:endParaRPr lang="en-US" dirty="0"/>
           </a:p>
@@ -12204,7 +12204,7 @@
           <a:p>
             <a:fld id="{5958763E-B898-436D-883D-03711491D54A}" type="datetimeFigureOut">
               <a:rPr lang="en-US" smtClean="0"/>
-              <a:t>5/7/2021</a:t>
+              <a:t>6/24/2021</a:t>
             </a:fld>
             <a:endParaRPr lang="en-US"/>
           </a:p>
@@ -12328,7 +12328,7 @@
           <a:p>
             <a:fld id="{5958763E-B898-436D-883D-03711491D54A}" type="datetimeFigureOut">
               <a:rPr lang="en-US" smtClean="0"/>
-              <a:t>5/7/2021</a:t>
+              <a:t>6/24/2021</a:t>
             </a:fld>
             <a:endParaRPr lang="en-US"/>
           </a:p>
@@ -12452,7 +12452,7 @@
           <a:p>
             <a:fld id="{5958763E-B898-436D-883D-03711491D54A}" type="datetimeFigureOut">
               <a:rPr lang="en-US" smtClean="0"/>
-              <a:t>5/7/2021</a:t>
+              <a:t>6/24/2021</a:t>
             </a:fld>
             <a:endParaRPr lang="en-US"/>
           </a:p>
@@ -12576,7 +12576,7 @@
           <a:p>
             <a:fld id="{5958763E-B898-436D-883D-03711491D54A}" type="datetimeFigureOut">
               <a:rPr lang="en-US" smtClean="0"/>
-              <a:t>5/7/2021</a:t>
+              <a:t>6/24/2021</a:t>
             </a:fld>
             <a:endParaRPr lang="en-US"/>
           </a:p>
@@ -12700,7 +12700,7 @@
           <a:p>
             <a:fld id="{5958763E-B898-436D-883D-03711491D54A}" type="datetimeFigureOut">
               <a:rPr lang="en-US" smtClean="0"/>
-              <a:t>5/7/2021</a:t>
+              <a:t>6/24/2021</a:t>
             </a:fld>
             <a:endParaRPr lang="en-US"/>
           </a:p>
@@ -12824,7 +12824,7 @@
           <a:p>
             <a:fld id="{5958763E-B898-436D-883D-03711491D54A}" type="datetimeFigureOut">
               <a:rPr lang="en-US" smtClean="0"/>
-              <a:t>5/7/2021</a:t>
+              <a:t>6/24/2021</a:t>
             </a:fld>
             <a:endParaRPr lang="en-US"/>
           </a:p>
@@ -12948,7 +12948,7 @@
           <a:p>
             <a:fld id="{5958763E-B898-436D-883D-03711491D54A}" type="datetimeFigureOut">
               <a:rPr lang="en-US" smtClean="0"/>
-              <a:t>5/7/2021</a:t>
+              <a:t>6/24/2021</a:t>
             </a:fld>
             <a:endParaRPr lang="en-US"/>
           </a:p>
@@ -13072,7 +13072,7 @@
           <a:p>
             <a:fld id="{5958763E-B898-436D-883D-03711491D54A}" type="datetimeFigureOut">
               <a:rPr lang="en-US" smtClean="0"/>
-              <a:t>5/7/2021</a:t>
+              <a:t>6/24/2021</a:t>
             </a:fld>
             <a:endParaRPr lang="en-US"/>
           </a:p>
@@ -13205,7 +13205,7 @@
           <a:p>
             <a:fld id="{5958763E-B898-436D-883D-03711491D54A}" type="datetimeFigureOut">
               <a:rPr lang="en-US" smtClean="0"/>
-              <a:t>5/7/2021</a:t>
+              <a:t>6/24/2021</a:t>
             </a:fld>
             <a:endParaRPr lang="en-US"/>
           </a:p>
@@ -16544,7 +16544,7 @@
             <a:fld id="{1C2D31DE-C454-491C-B5C3-F097855E3DF7}" type="datetime4">
               <a:rPr lang="en-US" smtClean="0"/>
               <a:pPr/>
-              <a:t>May 7, 2021</a:t>
+              <a:t>June 24, 2021</a:t>
             </a:fld>
             <a:endParaRPr lang="en-US" dirty="0"/>
           </a:p>
@@ -28780,7 +28780,7 @@
           <a:p>
             <a:fld id="{5958763E-B898-436D-883D-03711491D54A}" type="datetimeFigureOut">
               <a:rPr lang="en-US" smtClean="0"/>
-              <a:t>5/7/2021</a:t>
+              <a:t>6/24/2021</a:t>
             </a:fld>
             <a:endParaRPr lang="en-US"/>
           </a:p>
@@ -29182,7 +29182,7 @@
           <a:p>
             <a:fld id="{5958763E-B898-436D-883D-03711491D54A}" type="datetimeFigureOut">
               <a:rPr lang="en-US" smtClean="0"/>
-              <a:t>5/7/2021</a:t>
+              <a:t>6/24/2021</a:t>
             </a:fld>
             <a:endParaRPr lang="en-US"/>
           </a:p>
@@ -29476,7 +29476,7 @@
           <a:p>
             <a:fld id="{5958763E-B898-436D-883D-03711491D54A}" type="datetimeFigureOut">
               <a:rPr lang="en-US" smtClean="0"/>
-              <a:t>5/7/2021</a:t>
+              <a:t>6/24/2021</a:t>
             </a:fld>
             <a:endParaRPr lang="en-US"/>
           </a:p>
@@ -29677,7 +29677,7 @@
           <a:p>
             <a:fld id="{5958763E-B898-436D-883D-03711491D54A}" type="datetimeFigureOut">
               <a:rPr lang="en-US" smtClean="0"/>
-              <a:t>5/7/2021</a:t>
+              <a:t>6/24/2021</a:t>
             </a:fld>
             <a:endParaRPr lang="en-US"/>
           </a:p>
@@ -29938,7 +29938,7 @@
           <a:p>
             <a:fld id="{5958763E-B898-436D-883D-03711491D54A}" type="datetimeFigureOut">
               <a:rPr lang="en-US" smtClean="0"/>
-              <a:t>5/7/2021</a:t>
+              <a:t>6/24/2021</a:t>
             </a:fld>
             <a:endParaRPr lang="en-US"/>
           </a:p>
@@ -30446,7 +30446,7 @@
           <a:p>
             <a:fld id="{5958763E-B898-436D-883D-03711491D54A}" type="datetimeFigureOut">
               <a:rPr lang="en-US" smtClean="0"/>
-              <a:t>5/7/2021</a:t>
+              <a:t>6/24/2021</a:t>
             </a:fld>
             <a:endParaRPr lang="en-US"/>
           </a:p>
@@ -30925,7 +30925,7 @@
           <a:p>
             <a:fld id="{5958763E-B898-436D-883D-03711491D54A}" type="datetimeFigureOut">
               <a:rPr lang="en-US" smtClean="0"/>
-              <a:t>5/7/2021</a:t>
+              <a:t>6/24/2021</a:t>
             </a:fld>
             <a:endParaRPr lang="en-US"/>
           </a:p>
@@ -31744,7 +31744,7 @@
           <a:p>
             <a:fld id="{5958763E-B898-436D-883D-03711491D54A}" type="datetimeFigureOut">
               <a:rPr lang="en-US" smtClean="0"/>
-              <a:t>5/7/2021</a:t>
+              <a:t>6/24/2021</a:t>
             </a:fld>
             <a:endParaRPr lang="en-US"/>
           </a:p>
@@ -31945,7 +31945,7 @@
           <a:p>
             <a:fld id="{5958763E-B898-436D-883D-03711491D54A}" type="datetimeFigureOut">
               <a:rPr lang="en-US" smtClean="0"/>
-              <a:t>5/7/2021</a:t>
+              <a:t>6/24/2021</a:t>
             </a:fld>
             <a:endParaRPr lang="en-US"/>
           </a:p>
@@ -32280,7 +32280,7 @@
           <a:p>
             <a:fld id="{5958763E-B898-436D-883D-03711491D54A}" type="datetimeFigureOut">
               <a:rPr lang="en-US" smtClean="0"/>
-              <a:t>5/7/2021</a:t>
+              <a:t>6/24/2021</a:t>
             </a:fld>
             <a:endParaRPr lang="en-US"/>
           </a:p>
@@ -32510,7 +32510,7 @@
           <a:p>
             <a:fld id="{5958763E-B898-436D-883D-03711491D54A}" type="datetimeFigureOut">
               <a:rPr lang="en-US" smtClean="0"/>
-              <a:t>5/7/2021</a:t>
+              <a:t>6/24/2021</a:t>
             </a:fld>
             <a:endParaRPr lang="en-US"/>
           </a:p>
@@ -32754,7 +32754,7 @@
           <a:p>
             <a:fld id="{5958763E-B898-436D-883D-03711491D54A}" type="datetimeFigureOut">
               <a:rPr lang="en-US" smtClean="0"/>
-              <a:t>5/7/2021</a:t>
+              <a:t>6/24/2021</a:t>
             </a:fld>
             <a:endParaRPr lang="en-US"/>
           </a:p>
@@ -36389,10 +36389,15 @@
               <a:rPr lang="en-US" sz="8800" b="1" dirty="0">
                 <a:latin typeface="Consolas" panose="020B0609020204030204" pitchFamily="49" charset="0"/>
               </a:rPr>
-              <a:t>&lt; </a:t>
+              <a:t>&lt;</a:t>
             </a:r>
             <a:r>
-              <a:rPr lang="en-US" sz="8800" dirty="0">
+              <a:rPr lang="en-US" sz="8800" i="1" dirty="0">
+                <a:solidFill>
+                  <a:schemeClr val="bg2">
+                    <a:lumMod val="90000"/>
+                  </a:schemeClr>
+                </a:solidFill>
                 <a:latin typeface="Consolas" panose="020B0609020204030204" pitchFamily="49" charset="0"/>
               </a:rPr>
               <a:t>element-name</a:t>
@@ -36401,7 +36406,7 @@
               <a:rPr lang="en-US" sz="8800" b="1" dirty="0">
                 <a:latin typeface="Consolas" panose="020B0609020204030204" pitchFamily="49" charset="0"/>
               </a:rPr>
-              <a:t> &gt;</a:t>
+              <a:t>&gt;</a:t>
             </a:r>
           </a:p>
           <a:p>
@@ -36434,10 +36439,15 @@
               <a:rPr lang="en-US" sz="8800" b="1" dirty="0">
                 <a:latin typeface="Consolas" panose="020B0609020204030204" pitchFamily="49" charset="0"/>
               </a:rPr>
-              <a:t>&lt;/ </a:t>
+              <a:t>&lt;/</a:t>
             </a:r>
             <a:r>
-              <a:rPr lang="en-US" sz="8800" dirty="0">
+              <a:rPr lang="en-US" sz="8800" i="1" dirty="0">
+                <a:solidFill>
+                  <a:schemeClr val="bg2">
+                    <a:lumMod val="90000"/>
+                  </a:schemeClr>
+                </a:solidFill>
                 <a:latin typeface="Consolas" panose="020B0609020204030204" pitchFamily="49" charset="0"/>
               </a:rPr>
               <a:t>element-name</a:t>
@@ -36446,7 +36456,7 @@
               <a:rPr lang="en-US" sz="8800" b="1" dirty="0">
                 <a:latin typeface="Consolas" panose="020B0609020204030204" pitchFamily="49" charset="0"/>
               </a:rPr>
-              <a:t> &gt;</a:t>
+              <a:t>&gt;</a:t>
             </a:r>
           </a:p>
         </p:txBody>

</xml_diff>

<commit_message>
Update gitbook 2021-06-24 12:57:32
</commit_message>
<xml_diff>
--- a/Session5HtmlIntro/HelloHtml.pptx
+++ b/Session5HtmlIntro/HelloHtml.pptx
@@ -224,7 +224,7 @@
           <a:p>
             <a:fld id="{19104133-B5B0-4351-8158-4F0E5EB1E2BF}" type="datetimeFigureOut">
               <a:rPr lang="en-US" smtClean="0"/>
-              <a:t>5/7/2021</a:t>
+              <a:t>6/24/2021</a:t>
             </a:fld>
             <a:endParaRPr lang="en-US"/>
           </a:p>
@@ -1688,7 +1688,7 @@
             <a:fld id="{1C2D31DE-C454-491C-B5C3-F097855E3DF7}" type="datetime4">
               <a:rPr lang="en-US" smtClean="0"/>
               <a:pPr/>
-              <a:t>May 7, 2021</a:t>
+              <a:t>June 24, 2021</a:t>
             </a:fld>
             <a:endParaRPr lang="en-US" dirty="0"/>
           </a:p>
@@ -5080,7 +5080,7 @@
           <a:p>
             <a:fld id="{5958763E-B898-436D-883D-03711491D54A}" type="datetimeFigureOut">
               <a:rPr lang="en-US" smtClean="0"/>
-              <a:t>5/7/2021</a:t>
+              <a:t>6/24/2021</a:t>
             </a:fld>
             <a:endParaRPr lang="en-US"/>
           </a:p>
@@ -5273,7 +5273,7 @@
           <a:p>
             <a:fld id="{5958763E-B898-436D-883D-03711491D54A}" type="datetimeFigureOut">
               <a:rPr lang="en-US" smtClean="0"/>
-              <a:t>5/7/2021</a:t>
+              <a:t>6/24/2021</a:t>
             </a:fld>
             <a:endParaRPr lang="en-US"/>
           </a:p>
@@ -5523,7 +5523,7 @@
           <a:p>
             <a:fld id="{5958763E-B898-436D-883D-03711491D54A}" type="datetimeFigureOut">
               <a:rPr lang="en-US" smtClean="0"/>
-              <a:t>5/7/2021</a:t>
+              <a:t>6/24/2021</a:t>
             </a:fld>
             <a:endParaRPr lang="en-US"/>
           </a:p>
@@ -5871,7 +5871,7 @@
           <a:p>
             <a:fld id="{5958763E-B898-436D-883D-03711491D54A}" type="datetimeFigureOut">
               <a:rPr lang="en-US" smtClean="0"/>
-              <a:t>5/7/2021</a:t>
+              <a:t>6/24/2021</a:t>
             </a:fld>
             <a:endParaRPr lang="en-US"/>
           </a:p>
@@ -6287,7 +6287,7 @@
           <a:p>
             <a:fld id="{5958763E-B898-436D-883D-03711491D54A}" type="datetimeFigureOut">
               <a:rPr lang="en-US" smtClean="0"/>
-              <a:t>5/7/2021</a:t>
+              <a:t>6/24/2021</a:t>
             </a:fld>
             <a:endParaRPr lang="en-US"/>
           </a:p>
@@ -6788,7 +6788,7 @@
           <a:p>
             <a:fld id="{5958763E-B898-436D-883D-03711491D54A}" type="datetimeFigureOut">
               <a:rPr lang="en-US" smtClean="0"/>
-              <a:t>5/7/2021</a:t>
+              <a:t>6/24/2021</a:t>
             </a:fld>
             <a:endParaRPr lang="en-US"/>
           </a:p>
@@ -7239,7 +7239,7 @@
           <a:p>
             <a:fld id="{5958763E-B898-436D-883D-03711491D54A}" type="datetimeFigureOut">
               <a:rPr lang="en-US" smtClean="0"/>
-              <a:t>5/7/2021</a:t>
+              <a:t>6/24/2021</a:t>
             </a:fld>
             <a:endParaRPr lang="en-US"/>
           </a:p>
@@ -7850,7 +7850,7 @@
           <a:p>
             <a:fld id="{5958763E-B898-436D-883D-03711491D54A}" type="datetimeFigureOut">
               <a:rPr lang="en-US" smtClean="0"/>
-              <a:t>5/7/2021</a:t>
+              <a:t>6/24/2021</a:t>
             </a:fld>
             <a:endParaRPr lang="en-US"/>
           </a:p>
@@ -8621,7 +8621,7 @@
           <a:p>
             <a:fld id="{5958763E-B898-436D-883D-03711491D54A}" type="datetimeFigureOut">
               <a:rPr lang="en-US" smtClean="0"/>
-              <a:t>5/7/2021</a:t>
+              <a:t>6/24/2021</a:t>
             </a:fld>
             <a:endParaRPr lang="en-US"/>
           </a:p>
@@ -8725,7 +8725,7 @@
           <a:p>
             <a:fld id="{5958763E-B898-436D-883D-03711491D54A}" type="datetimeFigureOut">
               <a:rPr lang="en-US" smtClean="0"/>
-              <a:t>5/7/2021</a:t>
+              <a:t>6/24/2021</a:t>
             </a:fld>
             <a:endParaRPr lang="en-US"/>
           </a:p>
@@ -9052,7 +9052,7 @@
             <a:fld id="{1C2D31DE-C454-491C-B5C3-F097855E3DF7}" type="datetime4">
               <a:rPr lang="en-US" smtClean="0"/>
               <a:pPr/>
-              <a:t>May 7, 2021</a:t>
+              <a:t>June 24, 2021</a:t>
             </a:fld>
             <a:endParaRPr lang="en-US" dirty="0"/>
           </a:p>
@@ -12204,7 +12204,7 @@
           <a:p>
             <a:fld id="{5958763E-B898-436D-883D-03711491D54A}" type="datetimeFigureOut">
               <a:rPr lang="en-US" smtClean="0"/>
-              <a:t>5/7/2021</a:t>
+              <a:t>6/24/2021</a:t>
             </a:fld>
             <a:endParaRPr lang="en-US"/>
           </a:p>
@@ -12328,7 +12328,7 @@
           <a:p>
             <a:fld id="{5958763E-B898-436D-883D-03711491D54A}" type="datetimeFigureOut">
               <a:rPr lang="en-US" smtClean="0"/>
-              <a:t>5/7/2021</a:t>
+              <a:t>6/24/2021</a:t>
             </a:fld>
             <a:endParaRPr lang="en-US"/>
           </a:p>
@@ -12452,7 +12452,7 @@
           <a:p>
             <a:fld id="{5958763E-B898-436D-883D-03711491D54A}" type="datetimeFigureOut">
               <a:rPr lang="en-US" smtClean="0"/>
-              <a:t>5/7/2021</a:t>
+              <a:t>6/24/2021</a:t>
             </a:fld>
             <a:endParaRPr lang="en-US"/>
           </a:p>
@@ -12576,7 +12576,7 @@
           <a:p>
             <a:fld id="{5958763E-B898-436D-883D-03711491D54A}" type="datetimeFigureOut">
               <a:rPr lang="en-US" smtClean="0"/>
-              <a:t>5/7/2021</a:t>
+              <a:t>6/24/2021</a:t>
             </a:fld>
             <a:endParaRPr lang="en-US"/>
           </a:p>
@@ -12700,7 +12700,7 @@
           <a:p>
             <a:fld id="{5958763E-B898-436D-883D-03711491D54A}" type="datetimeFigureOut">
               <a:rPr lang="en-US" smtClean="0"/>
-              <a:t>5/7/2021</a:t>
+              <a:t>6/24/2021</a:t>
             </a:fld>
             <a:endParaRPr lang="en-US"/>
           </a:p>
@@ -12824,7 +12824,7 @@
           <a:p>
             <a:fld id="{5958763E-B898-436D-883D-03711491D54A}" type="datetimeFigureOut">
               <a:rPr lang="en-US" smtClean="0"/>
-              <a:t>5/7/2021</a:t>
+              <a:t>6/24/2021</a:t>
             </a:fld>
             <a:endParaRPr lang="en-US"/>
           </a:p>
@@ -12948,7 +12948,7 @@
           <a:p>
             <a:fld id="{5958763E-B898-436D-883D-03711491D54A}" type="datetimeFigureOut">
               <a:rPr lang="en-US" smtClean="0"/>
-              <a:t>5/7/2021</a:t>
+              <a:t>6/24/2021</a:t>
             </a:fld>
             <a:endParaRPr lang="en-US"/>
           </a:p>
@@ -13072,7 +13072,7 @@
           <a:p>
             <a:fld id="{5958763E-B898-436D-883D-03711491D54A}" type="datetimeFigureOut">
               <a:rPr lang="en-US" smtClean="0"/>
-              <a:t>5/7/2021</a:t>
+              <a:t>6/24/2021</a:t>
             </a:fld>
             <a:endParaRPr lang="en-US"/>
           </a:p>
@@ -13205,7 +13205,7 @@
           <a:p>
             <a:fld id="{5958763E-B898-436D-883D-03711491D54A}" type="datetimeFigureOut">
               <a:rPr lang="en-US" smtClean="0"/>
-              <a:t>5/7/2021</a:t>
+              <a:t>6/24/2021</a:t>
             </a:fld>
             <a:endParaRPr lang="en-US"/>
           </a:p>
@@ -16544,7 +16544,7 @@
             <a:fld id="{1C2D31DE-C454-491C-B5C3-F097855E3DF7}" type="datetime4">
               <a:rPr lang="en-US" smtClean="0"/>
               <a:pPr/>
-              <a:t>May 7, 2021</a:t>
+              <a:t>June 24, 2021</a:t>
             </a:fld>
             <a:endParaRPr lang="en-US" dirty="0"/>
           </a:p>
@@ -28780,7 +28780,7 @@
           <a:p>
             <a:fld id="{5958763E-B898-436D-883D-03711491D54A}" type="datetimeFigureOut">
               <a:rPr lang="en-US" smtClean="0"/>
-              <a:t>5/7/2021</a:t>
+              <a:t>6/24/2021</a:t>
             </a:fld>
             <a:endParaRPr lang="en-US"/>
           </a:p>
@@ -29182,7 +29182,7 @@
           <a:p>
             <a:fld id="{5958763E-B898-436D-883D-03711491D54A}" type="datetimeFigureOut">
               <a:rPr lang="en-US" smtClean="0"/>
-              <a:t>5/7/2021</a:t>
+              <a:t>6/24/2021</a:t>
             </a:fld>
             <a:endParaRPr lang="en-US"/>
           </a:p>
@@ -29476,7 +29476,7 @@
           <a:p>
             <a:fld id="{5958763E-B898-436D-883D-03711491D54A}" type="datetimeFigureOut">
               <a:rPr lang="en-US" smtClean="0"/>
-              <a:t>5/7/2021</a:t>
+              <a:t>6/24/2021</a:t>
             </a:fld>
             <a:endParaRPr lang="en-US"/>
           </a:p>
@@ -29677,7 +29677,7 @@
           <a:p>
             <a:fld id="{5958763E-B898-436D-883D-03711491D54A}" type="datetimeFigureOut">
               <a:rPr lang="en-US" smtClean="0"/>
-              <a:t>5/7/2021</a:t>
+              <a:t>6/24/2021</a:t>
             </a:fld>
             <a:endParaRPr lang="en-US"/>
           </a:p>
@@ -29938,7 +29938,7 @@
           <a:p>
             <a:fld id="{5958763E-B898-436D-883D-03711491D54A}" type="datetimeFigureOut">
               <a:rPr lang="en-US" smtClean="0"/>
-              <a:t>5/7/2021</a:t>
+              <a:t>6/24/2021</a:t>
             </a:fld>
             <a:endParaRPr lang="en-US"/>
           </a:p>
@@ -30446,7 +30446,7 @@
           <a:p>
             <a:fld id="{5958763E-B898-436D-883D-03711491D54A}" type="datetimeFigureOut">
               <a:rPr lang="en-US" smtClean="0"/>
-              <a:t>5/7/2021</a:t>
+              <a:t>6/24/2021</a:t>
             </a:fld>
             <a:endParaRPr lang="en-US"/>
           </a:p>
@@ -30925,7 +30925,7 @@
           <a:p>
             <a:fld id="{5958763E-B898-436D-883D-03711491D54A}" type="datetimeFigureOut">
               <a:rPr lang="en-US" smtClean="0"/>
-              <a:t>5/7/2021</a:t>
+              <a:t>6/24/2021</a:t>
             </a:fld>
             <a:endParaRPr lang="en-US"/>
           </a:p>
@@ -31744,7 +31744,7 @@
           <a:p>
             <a:fld id="{5958763E-B898-436D-883D-03711491D54A}" type="datetimeFigureOut">
               <a:rPr lang="en-US" smtClean="0"/>
-              <a:t>5/7/2021</a:t>
+              <a:t>6/24/2021</a:t>
             </a:fld>
             <a:endParaRPr lang="en-US"/>
           </a:p>
@@ -31945,7 +31945,7 @@
           <a:p>
             <a:fld id="{5958763E-B898-436D-883D-03711491D54A}" type="datetimeFigureOut">
               <a:rPr lang="en-US" smtClean="0"/>
-              <a:t>5/7/2021</a:t>
+              <a:t>6/24/2021</a:t>
             </a:fld>
             <a:endParaRPr lang="en-US"/>
           </a:p>
@@ -32280,7 +32280,7 @@
           <a:p>
             <a:fld id="{5958763E-B898-436D-883D-03711491D54A}" type="datetimeFigureOut">
               <a:rPr lang="en-US" smtClean="0"/>
-              <a:t>5/7/2021</a:t>
+              <a:t>6/24/2021</a:t>
             </a:fld>
             <a:endParaRPr lang="en-US"/>
           </a:p>
@@ -32510,7 +32510,7 @@
           <a:p>
             <a:fld id="{5958763E-B898-436D-883D-03711491D54A}" type="datetimeFigureOut">
               <a:rPr lang="en-US" smtClean="0"/>
-              <a:t>5/7/2021</a:t>
+              <a:t>6/24/2021</a:t>
             </a:fld>
             <a:endParaRPr lang="en-US"/>
           </a:p>
@@ -32754,7 +32754,7 @@
           <a:p>
             <a:fld id="{5958763E-B898-436D-883D-03711491D54A}" type="datetimeFigureOut">
               <a:rPr lang="en-US" smtClean="0"/>
-              <a:t>5/7/2021</a:t>
+              <a:t>6/24/2021</a:t>
             </a:fld>
             <a:endParaRPr lang="en-US"/>
           </a:p>
@@ -36389,10 +36389,15 @@
               <a:rPr lang="en-US" sz="8800" b="1" dirty="0">
                 <a:latin typeface="Consolas" panose="020B0609020204030204" pitchFamily="49" charset="0"/>
               </a:rPr>
-              <a:t>&lt; </a:t>
+              <a:t>&lt;</a:t>
             </a:r>
             <a:r>
-              <a:rPr lang="en-US" sz="8800" dirty="0">
+              <a:rPr lang="en-US" sz="8800" i="1" dirty="0">
+                <a:solidFill>
+                  <a:schemeClr val="bg2">
+                    <a:lumMod val="90000"/>
+                  </a:schemeClr>
+                </a:solidFill>
                 <a:latin typeface="Consolas" panose="020B0609020204030204" pitchFamily="49" charset="0"/>
               </a:rPr>
               <a:t>element-name</a:t>
@@ -36401,7 +36406,7 @@
               <a:rPr lang="en-US" sz="8800" b="1" dirty="0">
                 <a:latin typeface="Consolas" panose="020B0609020204030204" pitchFamily="49" charset="0"/>
               </a:rPr>
-              <a:t> &gt;</a:t>
+              <a:t>&gt;</a:t>
             </a:r>
           </a:p>
           <a:p>
@@ -36434,10 +36439,15 @@
               <a:rPr lang="en-US" sz="8800" b="1" dirty="0">
                 <a:latin typeface="Consolas" panose="020B0609020204030204" pitchFamily="49" charset="0"/>
               </a:rPr>
-              <a:t>&lt;/ </a:t>
+              <a:t>&lt;/</a:t>
             </a:r>
             <a:r>
-              <a:rPr lang="en-US" sz="8800" dirty="0">
+              <a:rPr lang="en-US" sz="8800" i="1" dirty="0">
+                <a:solidFill>
+                  <a:schemeClr val="bg2">
+                    <a:lumMod val="90000"/>
+                  </a:schemeClr>
+                </a:solidFill>
                 <a:latin typeface="Consolas" panose="020B0609020204030204" pitchFamily="49" charset="0"/>
               </a:rPr>
               <a:t>element-name</a:t>
@@ -36446,7 +36456,7 @@
               <a:rPr lang="en-US" sz="8800" b="1" dirty="0">
                 <a:latin typeface="Consolas" panose="020B0609020204030204" pitchFamily="49" charset="0"/>
               </a:rPr>
-              <a:t> &gt;</a:t>
+              <a:t>&gt;</a:t>
             </a:r>
           </a:p>
         </p:txBody>

</xml_diff>